<commit_message>
fixed presentation, added requirments.txt
</commit_message>
<xml_diff>
--- a/docs/Vehicle Damage Project.pptx
+++ b/docs/Vehicle Damage Project.pptx
@@ -122,7 +122,7 @@
 <file path=ppt/revisionInfo.xml><?xml version="1.0" encoding="utf-8"?>
 <p1510:revInfo xmlns:a="http://schemas.openxmlformats.org/drawingml/2006/main" xmlns:r="http://schemas.openxmlformats.org/officeDocument/2006/relationships" xmlns:p1510="http://schemas.microsoft.com/office/powerpoint/2015/10/main">
   <p1510:revLst>
-    <p1510:client id="{55B62DE7-970D-497F-985B-DE3F15268842}" v="78" dt="2024-08-10T12:26:37.244"/>
+    <p1510:client id="{55B62DE7-970D-497F-985B-DE3F15268842}" v="83" dt="2024-08-10T13:55:26.454"/>
   </p1510:revLst>
 </p1510:revInfo>
 </file>
@@ -132,7 +132,7 @@
   <pc:docChgLst>
     <pc:chgData name="Ravid Goldenberg" userId="52761628-e8dd-4094-acc1-42d0917aa3d7" providerId="ADAL" clId="{55B62DE7-970D-497F-985B-DE3F15268842}"/>
     <pc:docChg chg="undo redo custSel addSld delSld modSld">
-      <pc:chgData name="Ravid Goldenberg" userId="52761628-e8dd-4094-acc1-42d0917aa3d7" providerId="ADAL" clId="{55B62DE7-970D-497F-985B-DE3F15268842}" dt="2024-08-10T12:31:18.947" v="602" actId="1076"/>
+      <pc:chgData name="Ravid Goldenberg" userId="52761628-e8dd-4094-acc1-42d0917aa3d7" providerId="ADAL" clId="{55B62DE7-970D-497F-985B-DE3F15268842}" dt="2024-08-10T13:56:06.315" v="635" actId="20577"/>
       <pc:docMkLst>
         <pc:docMk/>
       </pc:docMkLst>
@@ -435,7 +435,7 @@
         </pc:picChg>
       </pc:sldChg>
       <pc:sldChg chg="addSp delSp modSp new mod">
-        <pc:chgData name="Ravid Goldenberg" userId="52761628-e8dd-4094-acc1-42d0917aa3d7" providerId="ADAL" clId="{55B62DE7-970D-497F-985B-DE3F15268842}" dt="2024-08-10T12:06:03.229" v="369" actId="20577"/>
+        <pc:chgData name="Ravid Goldenberg" userId="52761628-e8dd-4094-acc1-42d0917aa3d7" providerId="ADAL" clId="{55B62DE7-970D-497F-985B-DE3F15268842}" dt="2024-08-10T13:56:06.315" v="635" actId="20577"/>
         <pc:sldMkLst>
           <pc:docMk/>
           <pc:sldMk cId="722238824" sldId="263"/>
@@ -449,7 +449,7 @@
           </ac:spMkLst>
         </pc:spChg>
         <pc:spChg chg="add del mod">
-          <ac:chgData name="Ravid Goldenberg" userId="52761628-e8dd-4094-acc1-42d0917aa3d7" providerId="ADAL" clId="{55B62DE7-970D-497F-985B-DE3F15268842}" dt="2024-08-10T12:06:03.229" v="369" actId="20577"/>
+          <ac:chgData name="Ravid Goldenberg" userId="52761628-e8dd-4094-acc1-42d0917aa3d7" providerId="ADAL" clId="{55B62DE7-970D-497F-985B-DE3F15268842}" dt="2024-08-10T13:56:06.315" v="635" actId="20577"/>
           <ac:spMkLst>
             <pc:docMk/>
             <pc:sldMk cId="722238824" sldId="263"/>
@@ -462,6 +462,22 @@
             <pc:docMk/>
             <pc:sldMk cId="722238824" sldId="263"/>
             <ac:spMk id="4" creationId="{42171F73-B4B7-3EBE-D66A-07CE82A50E11}"/>
+          </ac:spMkLst>
+        </pc:spChg>
+        <pc:spChg chg="add">
+          <ac:chgData name="Ravid Goldenberg" userId="52761628-e8dd-4094-acc1-42d0917aa3d7" providerId="ADAL" clId="{55B62DE7-970D-497F-985B-DE3F15268842}" dt="2024-08-10T13:55:17.382" v="620"/>
+          <ac:spMkLst>
+            <pc:docMk/>
+            <pc:sldMk cId="722238824" sldId="263"/>
+            <ac:spMk id="5" creationId="{397CAF8E-A2FA-BAE4-8333-A391D471CB63}"/>
+          </ac:spMkLst>
+        </pc:spChg>
+        <pc:spChg chg="add">
+          <ac:chgData name="Ravid Goldenberg" userId="52761628-e8dd-4094-acc1-42d0917aa3d7" providerId="ADAL" clId="{55B62DE7-970D-497F-985B-DE3F15268842}" dt="2024-08-10T13:55:22.375" v="621"/>
+          <ac:spMkLst>
+            <pc:docMk/>
+            <pc:sldMk cId="722238824" sldId="263"/>
+            <ac:spMk id="6" creationId="{7E79CD87-4934-3511-C4CB-26B1E6E0AA8D}"/>
           </ac:spMkLst>
         </pc:spChg>
       </pc:sldChg>
@@ -8178,7 +8194,9 @@
         </p:nvSpPr>
         <p:spPr/>
         <p:txBody>
-          <a:bodyPr/>
+          <a:bodyPr>
+            <a:normAutofit lnSpcReduction="10000"/>
+          </a:bodyPr>
           <a:lstStyle/>
           <a:p>
             <a:r>
@@ -8191,6 +8209,49 @@
               <a:rPr lang="en-US" dirty="0"/>
               <a:t>Cross-entropy loss function</a:t>
             </a:r>
+          </a:p>
+          <a:p>
+            <a:r>
+              <a:rPr lang="en-US" dirty="0"/>
+              <a:t>To address the limitations of the small dataset, we applied data augmentations: </a:t>
+            </a:r>
+            <a:r>
+              <a:rPr lang="en-US" dirty="0" err="1"/>
+              <a:t>ColorJitter</a:t>
+            </a:r>
+            <a:r>
+              <a:rPr lang="en-US" dirty="0"/>
+              <a:t>, </a:t>
+            </a:r>
+            <a:r>
+              <a:rPr lang="en-US" dirty="0" err="1"/>
+              <a:t>RandomHorizontalFlip</a:t>
+            </a:r>
+            <a:r>
+              <a:rPr lang="en-US" dirty="0"/>
+              <a:t>, </a:t>
+            </a:r>
+            <a:r>
+              <a:rPr lang="en-US" dirty="0" err="1"/>
+              <a:t>RandomAffine</a:t>
+            </a:r>
+            <a:r>
+              <a:rPr lang="en-US" dirty="0"/>
+              <a:t>, </a:t>
+            </a:r>
+            <a:r>
+              <a:rPr lang="en-US" dirty="0" err="1"/>
+              <a:t>RandomGaussianNoise</a:t>
+            </a:r>
+            <a:r>
+              <a:rPr lang="en-US" dirty="0"/>
+              <a:t>, </a:t>
+            </a:r>
+            <a:r>
+              <a:rPr lang="en-US" dirty="0" err="1"/>
+              <a:t>RandomCrop</a:t>
+            </a:r>
+            <a:endParaRPr lang="en-US" dirty="0"/>
           </a:p>
           <a:p>
             <a:r>

</xml_diff>